<commit_message>
Progress Report - team edit
</commit_message>
<xml_diff>
--- a/Dynogrid_ProgressReport_v1.pptx
+++ b/Dynogrid_ProgressReport_v1.pptx
@@ -3674,7 +3674,9 @@
         </p:nvSpPr>
         <p:spPr/>
         <p:txBody>
-          <a:bodyPr/>
+          <a:bodyPr>
+            <a:normAutofit/>
+          </a:bodyPr>
           <a:lstStyle/>
           <a:p>
             <a:r>
@@ -3685,7 +3687,7 @@
           <a:p>
             <a:r>
               <a:rPr lang="en-US" dirty="0" smtClean="0"/>
-              <a:t>Since distributed memory, only communicating with nearest neighbors is reasonable</a:t>
+              <a:t>Since distributed memory (due to problem size), only communicating with nearest neighbors is reasonable</a:t>
             </a:r>
           </a:p>
           <a:p>
@@ -3717,7 +3719,6 @@
               <a:rPr lang="en-US" dirty="0" smtClean="0"/>
               <a:t> in one dimension in 3D)</a:t>
             </a:r>
-            <a:endParaRPr lang="en-US" dirty="0"/>
           </a:p>
         </p:txBody>
       </p:sp>
@@ -3787,25 +3788,28 @@
         </p:spPr>
         <p:txBody>
           <a:bodyPr>
-            <a:normAutofit fontScale="62500" lnSpcReduction="20000"/>
+            <a:normAutofit fontScale="70000" lnSpcReduction="20000"/>
           </a:bodyPr>
           <a:lstStyle/>
           <a:p>
             <a:r>
               <a:rPr lang="en-US" dirty="0" smtClean="0"/>
-              <a:t>Start with a grid of maximum dimensions </a:t>
-            </a:r>
-            <a:r>
-              <a:rPr lang="en-US" dirty="0" err="1" smtClean="0"/>
-              <a:t>DxDxD</a:t>
-            </a:r>
-            <a:endParaRPr lang="en-US" dirty="0" smtClean="0"/>
+              <a:t>Start with a 3-dimensional grid</a:t>
+            </a:r>
           </a:p>
           <a:p>
             <a:pPr lvl="1"/>
             <a:r>
               <a:rPr lang="en-US" dirty="0" smtClean="0"/>
-              <a:t>A static grid would have D</a:t>
+              <a:t>If </a:t>
+            </a:r>
+            <a:r>
+              <a:rPr lang="en-US" u="sng" dirty="0" smtClean="0"/>
+              <a:t>D is the finest resolution per dimension</a:t>
+            </a:r>
+            <a:r>
+              <a:rPr lang="en-US" dirty="0" smtClean="0"/>
+              <a:t>, a static grid would have D</a:t>
             </a:r>
             <a:r>
               <a:rPr lang="en-US" baseline="30000" dirty="0" smtClean="0"/>
@@ -3820,15 +3824,21 @@
             <a:pPr lvl="1"/>
             <a:r>
               <a:rPr lang="en-US" dirty="0" smtClean="0"/>
-              <a:t>A </a:t>
-            </a:r>
-            <a:r>
-              <a:rPr lang="en-US" u="sng" dirty="0" smtClean="0"/>
-              <a:t>dynamic </a:t>
-            </a:r>
-            <a:r>
-              <a:rPr lang="en-US" dirty="0" smtClean="0"/>
-              <a:t>grid has a(D</a:t>
+              <a:t>In real world, D ≈ 1,000,000 ; This is unmanageable</a:t>
+            </a:r>
+          </a:p>
+          <a:p>
+            <a:pPr lvl="1"/>
+            <a:r>
+              <a:rPr lang="en-US" dirty="0" smtClean="0"/>
+              <a:t>A dynamic grid only requires D resolution in small portion of the grid</a:t>
+            </a:r>
+          </a:p>
+          <a:p>
+            <a:pPr lvl="1"/>
+            <a:r>
+              <a:rPr lang="en-US" dirty="0" smtClean="0"/>
+              <a:t>For us: D ≈ 100 (D</a:t>
             </a:r>
             <a:r>
               <a:rPr lang="en-US" baseline="30000" dirty="0" smtClean="0"/>
@@ -3836,99 +3846,34 @@
             </a:r>
             <a:r>
               <a:rPr lang="en-US" dirty="0" smtClean="0"/>
-              <a:t>)+b((D/10)</a:t>
-            </a:r>
-            <a:r>
-              <a:rPr lang="en-US" baseline="30000" dirty="0" smtClean="0"/>
-              <a:t>3</a:t>
-            </a:r>
-            <a:r>
-              <a:rPr lang="en-US" dirty="0" smtClean="0"/>
-              <a:t>)+c((D/100)</a:t>
-            </a:r>
-            <a:r>
-              <a:rPr lang="en-US" baseline="30000" dirty="0" smtClean="0"/>
-              <a:t>3</a:t>
-            </a:r>
-            <a:r>
-              <a:rPr lang="en-US" dirty="0" smtClean="0"/>
-              <a:t>)… grid points, where a=% volume where highest resolution is required, </a:t>
-            </a:r>
-            <a:r>
-              <a:rPr lang="en-US" dirty="0" err="1" smtClean="0"/>
-              <a:t>b</a:t>
-            </a:r>
-            <a:r>
-              <a:rPr lang="en-US" dirty="0" smtClean="0"/>
-              <a:t>=% volume where second highest resolution is required, etc.</a:t>
+              <a:t> ≈ 1,000,000), but only in ≈1/1,000 of the grid</a:t>
             </a:r>
           </a:p>
           <a:p>
             <a:pPr lvl="1"/>
             <a:r>
               <a:rPr lang="en-US" dirty="0" smtClean="0"/>
-              <a:t>In our case a≈1/1000, </a:t>
-            </a:r>
-            <a:r>
-              <a:rPr lang="en-US" dirty="0" err="1" smtClean="0"/>
-              <a:t>b</a:t>
-            </a:r>
-            <a:r>
-              <a:rPr lang="en-US" dirty="0" smtClean="0"/>
-              <a:t>&lt;</a:t>
-            </a:r>
-            <a:r>
-              <a:rPr lang="en-US" dirty="0" smtClean="0"/>
-              <a:t>1 so we have O(D</a:t>
-            </a:r>
-            <a:r>
-              <a:rPr lang="en-US" baseline="30000" dirty="0" smtClean="0"/>
-              <a:t>3</a:t>
-            </a:r>
-            <a:r>
-              <a:rPr lang="en-US" dirty="0" smtClean="0"/>
-              <a:t>/1000) grid points (far less than O(D</a:t>
-            </a:r>
-            <a:r>
-              <a:rPr lang="en-US" baseline="30000" dirty="0" smtClean="0"/>
-              <a:t>3</a:t>
-            </a:r>
-            <a:r>
-              <a:rPr lang="en-US" dirty="0" smtClean="0"/>
-              <a:t>)), but in a concentrated area</a:t>
+              <a:t>However: dynamic grid makes load balancing very tricky</a:t>
+            </a:r>
+          </a:p>
+          <a:p>
+            <a:r>
+              <a:rPr lang="en-US" dirty="0" smtClean="0"/>
+              <a:t>Problem: Load balancing</a:t>
             </a:r>
           </a:p>
           <a:p>
             <a:pPr lvl="1"/>
             <a:r>
               <a:rPr lang="en-US" dirty="0" smtClean="0"/>
-              <a:t>Summary: Most of our grid points are in a highly concentrated moving area, so updating grid values (while also updating particles) requires an intelligent load balancing algorithm</a:t>
-            </a:r>
-          </a:p>
-          <a:p>
-            <a:r>
-              <a:rPr lang="en-US" dirty="0" smtClean="0"/>
-              <a:t>Problem: Load balancing</a:t>
+              <a:t>How to balance: Grid points? Particles? Both?</a:t>
             </a:r>
           </a:p>
           <a:p>
             <a:pPr lvl="1"/>
             <a:r>
               <a:rPr lang="en-US" dirty="0" smtClean="0"/>
-              <a:t>How to balance: Grid points? Particles? Both?</a:t>
-            </a:r>
-          </a:p>
-          <a:p>
-            <a:pPr lvl="1"/>
-            <a:r>
-              <a:rPr lang="en-US" dirty="0" smtClean="0"/>
               <a:t>Answer: Get weighted calculation of current grid + particle load, Broadcast All2All load sizes, each grid point decides to either Give some load or Take some load</a:t>
-            </a:r>
-          </a:p>
-          <a:p>
-            <a:r>
-              <a:rPr lang="en-US" dirty="0" smtClean="0"/>
-              <a:t>Bigger problem: Communication</a:t>
             </a:r>
           </a:p>
           <a:p>
@@ -4008,7 +3953,7 @@
         <p:spPr/>
         <p:txBody>
           <a:bodyPr>
-            <a:normAutofit fontScale="92500" lnSpcReduction="10000"/>
+            <a:normAutofit fontScale="92500" lnSpcReduction="20000"/>
           </a:bodyPr>
           <a:lstStyle/>
           <a:p>
@@ -4074,7 +4019,7 @@
             </a:r>
             <a:r>
               <a:rPr lang="en-US" dirty="0" smtClean="0"/>
-              <a:t> + (l+M/(p</a:t>
+              <a:t> + (L+M/p</a:t>
             </a:r>
             <a:r>
               <a:rPr lang="en-US" baseline="30000" dirty="0" smtClean="0"/>
@@ -4082,21 +4027,57 @@
             </a:r>
             <a:r>
               <a:rPr lang="en-US" dirty="0" smtClean="0"/>
-              <a:t>)b) + </a:t>
+              <a:t>b) + (L log </a:t>
+            </a:r>
+            <a:r>
+              <a:rPr lang="en-US" dirty="0" err="1" smtClean="0"/>
+              <a:t>p</a:t>
+            </a:r>
+            <a:r>
+              <a:rPr lang="en-US" dirty="0" smtClean="0"/>
+              <a:t> + (</a:t>
+            </a:r>
+            <a:r>
+              <a:rPr lang="en-US" dirty="0" err="1" smtClean="0"/>
+              <a:t>n</a:t>
+            </a:r>
+            <a:r>
+              <a:rPr lang="en-US" dirty="0" smtClean="0"/>
+              <a:t> L + p</a:t>
+            </a:r>
+            <a:r>
+              <a:rPr lang="en-US" baseline="30000" dirty="0" smtClean="0"/>
+              <a:t>2/3</a:t>
+            </a:r>
+            <a:r>
+              <a:rPr lang="en-US" dirty="0" smtClean="0"/>
+              <a:t>/b) p</a:t>
+            </a:r>
+            <a:r>
+              <a:rPr lang="en-US" baseline="30000" dirty="0" smtClean="0"/>
+              <a:t>1</a:t>
+            </a:r>
+            <a:r>
+              <a:rPr lang="en-US" baseline="30000" smtClean="0"/>
+              <a:t>/3</a:t>
+            </a:r>
+            <a:r>
+              <a:rPr lang="en-US" smtClean="0"/>
+              <a:t>))</a:t>
             </a:r>
           </a:p>
           <a:p>
             <a:pPr lvl="2"/>
             <a:r>
               <a:rPr lang="en-US" dirty="0" smtClean="0"/>
-              <a:t>Second term = swapping particles between processors as they move</a:t>
+              <a:t>Second group of terms = swapping particles between processors as the particles move</a:t>
             </a:r>
           </a:p>
           <a:p>
             <a:pPr lvl="2"/>
             <a:r>
               <a:rPr lang="en-US" dirty="0" smtClean="0"/>
-              <a:t>Third term = Load balancing, i.e. intelligently Give or Take grid points</a:t>
+              <a:t>Third group of terms = Load balancing, i.e. intelligently Give or Take grid points</a:t>
             </a:r>
           </a:p>
         </p:txBody>
@@ -4255,7 +4236,7 @@
             </a:r>
             <a:r>
               <a:rPr lang="en-US" dirty="0" err="1" smtClean="0"/>
-              <a:t>octtrees</a:t>
+              <a:t>octrees</a:t>
             </a:r>
             <a:r>
               <a:rPr lang="en-US" dirty="0" smtClean="0"/>

</xml_diff>

<commit_message>
Progress Report - final
</commit_message>
<xml_diff>
--- a/Dynogrid_ProgressReport_v1.pptx
+++ b/Dynogrid_ProgressReport_v1.pptx
@@ -297,7 +297,7 @@
             <a:fld id="{A3323DE7-1CA7-4F98-8D89-1EC98E67AF2C}" type="datetimeFigureOut">
               <a:rPr lang="en-US" smtClean="0"/>
               <a:pPr/>
-              <a:t>4/12/15</a:t>
+              <a:t>4/13/15</a:t>
             </a:fld>
             <a:endParaRPr lang="en-US"/>
           </a:p>
@@ -349,7 +349,7 @@
     </p:spTree>
     <p:extLst>
       <p:ext uri="{BB962C8B-B14F-4D97-AF65-F5344CB8AC3E}">
-        <p14:creationId xmlns:p14="http://schemas.microsoft.com/office/powerpoint/2010/main" xmlns:p="http://schemas.openxmlformats.org/presentationml/2006/main" xmlns:r="http://schemas.openxmlformats.org/officeDocument/2006/relationships" xmlns:a="http://schemas.openxmlformats.org/drawingml/2006/main" xmlns="" val="1178169927"/>
+        <p14:creationId xmlns="" xmlns:a="http://schemas.openxmlformats.org/drawingml/2006/main" xmlns:r="http://schemas.openxmlformats.org/officeDocument/2006/relationships" xmlns:p="http://schemas.openxmlformats.org/presentationml/2006/main" xmlns:p14="http://schemas.microsoft.com/office/powerpoint/2010/main" xmlns:mv="urn:schemas-microsoft-com:mac:vml" xmlns:mc="http://schemas.openxmlformats.org/markup-compatibility/2006" val="1178169927"/>
       </p:ext>
     </p:extLst>
   </p:cSld>
@@ -469,7 +469,7 @@
             <a:fld id="{A3323DE7-1CA7-4F98-8D89-1EC98E67AF2C}" type="datetimeFigureOut">
               <a:rPr lang="en-US" smtClean="0"/>
               <a:pPr/>
-              <a:t>4/12/15</a:t>
+              <a:t>4/13/15</a:t>
             </a:fld>
             <a:endParaRPr lang="en-US"/>
           </a:p>
@@ -521,7 +521,7 @@
     </p:spTree>
     <p:extLst>
       <p:ext uri="{BB962C8B-B14F-4D97-AF65-F5344CB8AC3E}">
-        <p14:creationId xmlns:p14="http://schemas.microsoft.com/office/powerpoint/2010/main" xmlns:p="http://schemas.openxmlformats.org/presentationml/2006/main" xmlns:r="http://schemas.openxmlformats.org/officeDocument/2006/relationships" xmlns:a="http://schemas.openxmlformats.org/drawingml/2006/main" xmlns="" val="917881071"/>
+        <p14:creationId xmlns="" xmlns:a="http://schemas.openxmlformats.org/drawingml/2006/main" xmlns:r="http://schemas.openxmlformats.org/officeDocument/2006/relationships" xmlns:p="http://schemas.openxmlformats.org/presentationml/2006/main" xmlns:p14="http://schemas.microsoft.com/office/powerpoint/2010/main" xmlns:mv="urn:schemas-microsoft-com:mac:vml" xmlns:mc="http://schemas.openxmlformats.org/markup-compatibility/2006" val="917881071"/>
       </p:ext>
     </p:extLst>
   </p:cSld>
@@ -651,7 +651,7 @@
             <a:fld id="{A3323DE7-1CA7-4F98-8D89-1EC98E67AF2C}" type="datetimeFigureOut">
               <a:rPr lang="en-US" smtClean="0"/>
               <a:pPr/>
-              <a:t>4/12/15</a:t>
+              <a:t>4/13/15</a:t>
             </a:fld>
             <a:endParaRPr lang="en-US"/>
           </a:p>
@@ -703,7 +703,7 @@
     </p:spTree>
     <p:extLst>
       <p:ext uri="{BB962C8B-B14F-4D97-AF65-F5344CB8AC3E}">
-        <p14:creationId xmlns:p14="http://schemas.microsoft.com/office/powerpoint/2010/main" xmlns:p="http://schemas.openxmlformats.org/presentationml/2006/main" xmlns:r="http://schemas.openxmlformats.org/officeDocument/2006/relationships" xmlns:a="http://schemas.openxmlformats.org/drawingml/2006/main" xmlns="" val="2323799925"/>
+        <p14:creationId xmlns="" xmlns:a="http://schemas.openxmlformats.org/drawingml/2006/main" xmlns:r="http://schemas.openxmlformats.org/officeDocument/2006/relationships" xmlns:p="http://schemas.openxmlformats.org/presentationml/2006/main" xmlns:p14="http://schemas.microsoft.com/office/powerpoint/2010/main" xmlns:mv="urn:schemas-microsoft-com:mac:vml" xmlns:mc="http://schemas.openxmlformats.org/markup-compatibility/2006" val="2323799925"/>
       </p:ext>
     </p:extLst>
   </p:cSld>
@@ -823,7 +823,7 @@
             <a:fld id="{A3323DE7-1CA7-4F98-8D89-1EC98E67AF2C}" type="datetimeFigureOut">
               <a:rPr lang="en-US" smtClean="0"/>
               <a:pPr/>
-              <a:t>4/12/15</a:t>
+              <a:t>4/13/15</a:t>
             </a:fld>
             <a:endParaRPr lang="en-US"/>
           </a:p>
@@ -875,7 +875,7 @@
     </p:spTree>
     <p:extLst>
       <p:ext uri="{BB962C8B-B14F-4D97-AF65-F5344CB8AC3E}">
-        <p14:creationId xmlns:p14="http://schemas.microsoft.com/office/powerpoint/2010/main" xmlns:p="http://schemas.openxmlformats.org/presentationml/2006/main" xmlns:r="http://schemas.openxmlformats.org/officeDocument/2006/relationships" xmlns:a="http://schemas.openxmlformats.org/drawingml/2006/main" xmlns="" val="1661309406"/>
+        <p14:creationId xmlns="" xmlns:a="http://schemas.openxmlformats.org/drawingml/2006/main" xmlns:r="http://schemas.openxmlformats.org/officeDocument/2006/relationships" xmlns:p="http://schemas.openxmlformats.org/presentationml/2006/main" xmlns:p14="http://schemas.microsoft.com/office/powerpoint/2010/main" xmlns:mv="urn:schemas-microsoft-com:mac:vml" xmlns:mc="http://schemas.openxmlformats.org/markup-compatibility/2006" val="1661309406"/>
       </p:ext>
     </p:extLst>
   </p:cSld>
@@ -1071,7 +1071,7 @@
             <a:fld id="{A3323DE7-1CA7-4F98-8D89-1EC98E67AF2C}" type="datetimeFigureOut">
               <a:rPr lang="en-US" smtClean="0"/>
               <a:pPr/>
-              <a:t>4/12/15</a:t>
+              <a:t>4/13/15</a:t>
             </a:fld>
             <a:endParaRPr lang="en-US"/>
           </a:p>
@@ -1123,7 +1123,7 @@
     </p:spTree>
     <p:extLst>
       <p:ext uri="{BB962C8B-B14F-4D97-AF65-F5344CB8AC3E}">
-        <p14:creationId xmlns:p14="http://schemas.microsoft.com/office/powerpoint/2010/main" xmlns:p="http://schemas.openxmlformats.org/presentationml/2006/main" xmlns:r="http://schemas.openxmlformats.org/officeDocument/2006/relationships" xmlns:a="http://schemas.openxmlformats.org/drawingml/2006/main" xmlns="" val="116544424"/>
+        <p14:creationId xmlns="" xmlns:a="http://schemas.openxmlformats.org/drawingml/2006/main" xmlns:r="http://schemas.openxmlformats.org/officeDocument/2006/relationships" xmlns:p="http://schemas.openxmlformats.org/presentationml/2006/main" xmlns:p14="http://schemas.microsoft.com/office/powerpoint/2010/main" xmlns:mv="urn:schemas-microsoft-com:mac:vml" xmlns:mc="http://schemas.openxmlformats.org/markup-compatibility/2006" val="116544424"/>
       </p:ext>
     </p:extLst>
   </p:cSld>
@@ -1361,7 +1361,7 @@
             <a:fld id="{A3323DE7-1CA7-4F98-8D89-1EC98E67AF2C}" type="datetimeFigureOut">
               <a:rPr lang="en-US" smtClean="0"/>
               <a:pPr/>
-              <a:t>4/12/15</a:t>
+              <a:t>4/13/15</a:t>
             </a:fld>
             <a:endParaRPr lang="en-US"/>
           </a:p>
@@ -1413,7 +1413,7 @@
     </p:spTree>
     <p:extLst>
       <p:ext uri="{BB962C8B-B14F-4D97-AF65-F5344CB8AC3E}">
-        <p14:creationId xmlns:p14="http://schemas.microsoft.com/office/powerpoint/2010/main" xmlns:p="http://schemas.openxmlformats.org/presentationml/2006/main" xmlns:r="http://schemas.openxmlformats.org/officeDocument/2006/relationships" xmlns:a="http://schemas.openxmlformats.org/drawingml/2006/main" xmlns="" val="2381061995"/>
+        <p14:creationId xmlns="" xmlns:a="http://schemas.openxmlformats.org/drawingml/2006/main" xmlns:r="http://schemas.openxmlformats.org/officeDocument/2006/relationships" xmlns:p="http://schemas.openxmlformats.org/presentationml/2006/main" xmlns:p14="http://schemas.microsoft.com/office/powerpoint/2010/main" xmlns:mv="urn:schemas-microsoft-com:mac:vml" xmlns:mc="http://schemas.openxmlformats.org/markup-compatibility/2006" val="2381061995"/>
       </p:ext>
     </p:extLst>
   </p:cSld>
@@ -1785,7 +1785,7 @@
             <a:fld id="{A3323DE7-1CA7-4F98-8D89-1EC98E67AF2C}" type="datetimeFigureOut">
               <a:rPr lang="en-US" smtClean="0"/>
               <a:pPr/>
-              <a:t>4/12/15</a:t>
+              <a:t>4/13/15</a:t>
             </a:fld>
             <a:endParaRPr lang="en-US"/>
           </a:p>
@@ -1837,7 +1837,7 @@
     </p:spTree>
     <p:extLst>
       <p:ext uri="{BB962C8B-B14F-4D97-AF65-F5344CB8AC3E}">
-        <p14:creationId xmlns:p14="http://schemas.microsoft.com/office/powerpoint/2010/main" xmlns:p="http://schemas.openxmlformats.org/presentationml/2006/main" xmlns:r="http://schemas.openxmlformats.org/officeDocument/2006/relationships" xmlns:a="http://schemas.openxmlformats.org/drawingml/2006/main" xmlns="" val="2995337799"/>
+        <p14:creationId xmlns="" xmlns:a="http://schemas.openxmlformats.org/drawingml/2006/main" xmlns:r="http://schemas.openxmlformats.org/officeDocument/2006/relationships" xmlns:p="http://schemas.openxmlformats.org/presentationml/2006/main" xmlns:p14="http://schemas.microsoft.com/office/powerpoint/2010/main" xmlns:mv="urn:schemas-microsoft-com:mac:vml" xmlns:mc="http://schemas.openxmlformats.org/markup-compatibility/2006" val="2995337799"/>
       </p:ext>
     </p:extLst>
   </p:cSld>
@@ -1905,7 +1905,7 @@
             <a:fld id="{A3323DE7-1CA7-4F98-8D89-1EC98E67AF2C}" type="datetimeFigureOut">
               <a:rPr lang="en-US" smtClean="0"/>
               <a:pPr/>
-              <a:t>4/12/15</a:t>
+              <a:t>4/13/15</a:t>
             </a:fld>
             <a:endParaRPr lang="en-US"/>
           </a:p>
@@ -1957,7 +1957,7 @@
     </p:spTree>
     <p:extLst>
       <p:ext uri="{BB962C8B-B14F-4D97-AF65-F5344CB8AC3E}">
-        <p14:creationId xmlns:p14="http://schemas.microsoft.com/office/powerpoint/2010/main" xmlns:p="http://schemas.openxmlformats.org/presentationml/2006/main" xmlns:r="http://schemas.openxmlformats.org/officeDocument/2006/relationships" xmlns:a="http://schemas.openxmlformats.org/drawingml/2006/main" xmlns="" val="415496904"/>
+        <p14:creationId xmlns="" xmlns:a="http://schemas.openxmlformats.org/drawingml/2006/main" xmlns:r="http://schemas.openxmlformats.org/officeDocument/2006/relationships" xmlns:p="http://schemas.openxmlformats.org/presentationml/2006/main" xmlns:p14="http://schemas.microsoft.com/office/powerpoint/2010/main" xmlns:mv="urn:schemas-microsoft-com:mac:vml" xmlns:mc="http://schemas.openxmlformats.org/markup-compatibility/2006" val="415496904"/>
       </p:ext>
     </p:extLst>
   </p:cSld>
@@ -2002,7 +2002,7 @@
             <a:fld id="{A3323DE7-1CA7-4F98-8D89-1EC98E67AF2C}" type="datetimeFigureOut">
               <a:rPr lang="en-US" smtClean="0"/>
               <a:pPr/>
-              <a:t>4/12/15</a:t>
+              <a:t>4/13/15</a:t>
             </a:fld>
             <a:endParaRPr lang="en-US"/>
           </a:p>
@@ -2054,7 +2054,7 @@
     </p:spTree>
     <p:extLst>
       <p:ext uri="{BB962C8B-B14F-4D97-AF65-F5344CB8AC3E}">
-        <p14:creationId xmlns:p14="http://schemas.microsoft.com/office/powerpoint/2010/main" xmlns:p="http://schemas.openxmlformats.org/presentationml/2006/main" xmlns:r="http://schemas.openxmlformats.org/officeDocument/2006/relationships" xmlns:a="http://schemas.openxmlformats.org/drawingml/2006/main" xmlns="" val="2607504586"/>
+        <p14:creationId xmlns="" xmlns:a="http://schemas.openxmlformats.org/drawingml/2006/main" xmlns:r="http://schemas.openxmlformats.org/officeDocument/2006/relationships" xmlns:p="http://schemas.openxmlformats.org/presentationml/2006/main" xmlns:p14="http://schemas.microsoft.com/office/powerpoint/2010/main" xmlns:mv="urn:schemas-microsoft-com:mac:vml" xmlns:mc="http://schemas.openxmlformats.org/markup-compatibility/2006" val="2607504586"/>
       </p:ext>
     </p:extLst>
   </p:cSld>
@@ -2281,7 +2281,7 @@
             <a:fld id="{A3323DE7-1CA7-4F98-8D89-1EC98E67AF2C}" type="datetimeFigureOut">
               <a:rPr lang="en-US" smtClean="0"/>
               <a:pPr/>
-              <a:t>4/12/15</a:t>
+              <a:t>4/13/15</a:t>
             </a:fld>
             <a:endParaRPr lang="en-US"/>
           </a:p>
@@ -2333,7 +2333,7 @@
     </p:spTree>
     <p:extLst>
       <p:ext uri="{BB962C8B-B14F-4D97-AF65-F5344CB8AC3E}">
-        <p14:creationId xmlns:p14="http://schemas.microsoft.com/office/powerpoint/2010/main" xmlns:p="http://schemas.openxmlformats.org/presentationml/2006/main" xmlns:r="http://schemas.openxmlformats.org/officeDocument/2006/relationships" xmlns:a="http://schemas.openxmlformats.org/drawingml/2006/main" xmlns="" val="508117069"/>
+        <p14:creationId xmlns="" xmlns:a="http://schemas.openxmlformats.org/drawingml/2006/main" xmlns:r="http://schemas.openxmlformats.org/officeDocument/2006/relationships" xmlns:p="http://schemas.openxmlformats.org/presentationml/2006/main" xmlns:p14="http://schemas.microsoft.com/office/powerpoint/2010/main" xmlns:mv="urn:schemas-microsoft-com:mac:vml" xmlns:mc="http://schemas.openxmlformats.org/markup-compatibility/2006" val="508117069"/>
       </p:ext>
     </p:extLst>
   </p:cSld>
@@ -2536,7 +2536,7 @@
             <a:fld id="{A3323DE7-1CA7-4F98-8D89-1EC98E67AF2C}" type="datetimeFigureOut">
               <a:rPr lang="en-US" smtClean="0"/>
               <a:pPr/>
-              <a:t>4/12/15</a:t>
+              <a:t>4/13/15</a:t>
             </a:fld>
             <a:endParaRPr lang="en-US"/>
           </a:p>
@@ -2588,7 +2588,7 @@
     </p:spTree>
     <p:extLst>
       <p:ext uri="{BB962C8B-B14F-4D97-AF65-F5344CB8AC3E}">
-        <p14:creationId xmlns:p14="http://schemas.microsoft.com/office/powerpoint/2010/main" xmlns:p="http://schemas.openxmlformats.org/presentationml/2006/main" xmlns:r="http://schemas.openxmlformats.org/officeDocument/2006/relationships" xmlns:a="http://schemas.openxmlformats.org/drawingml/2006/main" xmlns="" val="425774408"/>
+        <p14:creationId xmlns="" xmlns:a="http://schemas.openxmlformats.org/drawingml/2006/main" xmlns:r="http://schemas.openxmlformats.org/officeDocument/2006/relationships" xmlns:p="http://schemas.openxmlformats.org/presentationml/2006/main" xmlns:p14="http://schemas.microsoft.com/office/powerpoint/2010/main" xmlns:mv="urn:schemas-microsoft-com:mac:vml" xmlns:mc="http://schemas.openxmlformats.org/markup-compatibility/2006" val="425774408"/>
       </p:ext>
     </p:extLst>
   </p:cSld>
@@ -2751,7 +2751,7 @@
             <a:fld id="{A3323DE7-1CA7-4F98-8D89-1EC98E67AF2C}" type="datetimeFigureOut">
               <a:rPr lang="en-US" smtClean="0"/>
               <a:pPr/>
-              <a:t>4/12/15</a:t>
+              <a:t>4/13/15</a:t>
             </a:fld>
             <a:endParaRPr lang="en-US"/>
           </a:p>
@@ -2839,7 +2839,7 @@
     </p:spTree>
     <p:extLst>
       <p:ext uri="{BB962C8B-B14F-4D97-AF65-F5344CB8AC3E}">
-        <p14:creationId xmlns:p14="http://schemas.microsoft.com/office/powerpoint/2010/main" xmlns:p="http://schemas.openxmlformats.org/presentationml/2006/main" xmlns:r="http://schemas.openxmlformats.org/officeDocument/2006/relationships" xmlns:a="http://schemas.openxmlformats.org/drawingml/2006/main" xmlns="" val="2935169150"/>
+        <p14:creationId xmlns="" xmlns:a="http://schemas.openxmlformats.org/drawingml/2006/main" xmlns:r="http://schemas.openxmlformats.org/officeDocument/2006/relationships" xmlns:p="http://schemas.openxmlformats.org/presentationml/2006/main" xmlns:p14="http://schemas.microsoft.com/office/powerpoint/2010/main" xmlns:mv="urn:schemas-microsoft-com:mac:vml" xmlns:mc="http://schemas.openxmlformats.org/markup-compatibility/2006" val="2935169150"/>
       </p:ext>
     </p:extLst>
   </p:cSld>
@@ -3139,7 +3139,7 @@
           <a:blip r:embed="rId2" cstate="print">
             <a:extLst>
               <a:ext uri="{28A0092B-C50C-407E-A947-70E740481C1C}">
-                <a14:useLocalDpi xmlns:a14="http://schemas.microsoft.com/office/drawing/2010/main" xmlns:p="http://schemas.openxmlformats.org/presentationml/2006/main" xmlns:r="http://schemas.openxmlformats.org/officeDocument/2006/relationships" xmlns:a="http://schemas.openxmlformats.org/drawingml/2006/main" xmlns="" val="0"/>
+                <a14:useLocalDpi xmlns="" xmlns:a="http://schemas.openxmlformats.org/drawingml/2006/main" xmlns:r="http://schemas.openxmlformats.org/officeDocument/2006/relationships" xmlns:p="http://schemas.openxmlformats.org/presentationml/2006/main" xmlns:a14="http://schemas.microsoft.com/office/drawing/2010/main" xmlns:mv="urn:schemas-microsoft-com:mac:vml" xmlns:mc="http://schemas.openxmlformats.org/markup-compatibility/2006" val="0"/>
               </a:ext>
             </a:extLst>
           </a:blip>
@@ -3159,7 +3159,7 @@
           <a:noFill/>
           <a:extLst>
             <a:ext uri="{909E8E84-426E-40DD-AFC4-6F175D3DCCD1}">
-              <a14:hiddenFill xmlns:a14="http://schemas.microsoft.com/office/drawing/2010/main" xmlns:p="http://schemas.openxmlformats.org/presentationml/2006/main" xmlns:r="http://schemas.openxmlformats.org/officeDocument/2006/relationships" xmlns:a="http://schemas.openxmlformats.org/drawingml/2006/main" xmlns="">
+              <a14:hiddenFill xmlns="" xmlns:a="http://schemas.openxmlformats.org/drawingml/2006/main" xmlns:r="http://schemas.openxmlformats.org/officeDocument/2006/relationships" xmlns:p="http://schemas.openxmlformats.org/presentationml/2006/main" xmlns:a14="http://schemas.microsoft.com/office/drawing/2010/main" xmlns:mv="urn:schemas-microsoft-com:mac:vml" xmlns:mc="http://schemas.openxmlformats.org/markup-compatibility/2006">
                 <a:solidFill>
                   <a:srgbClr val="FFFFFF"/>
                 </a:solidFill>
@@ -3274,7 +3274,7 @@
           <a:blip r:embed="rId3">
             <a:extLst>
               <a:ext uri="{28A0092B-C50C-407E-A947-70E740481C1C}">
-                <a14:useLocalDpi xmlns:a14="http://schemas.microsoft.com/office/drawing/2010/main" xmlns:p="http://schemas.openxmlformats.org/presentationml/2006/main" xmlns:r="http://schemas.openxmlformats.org/officeDocument/2006/relationships" xmlns:a="http://schemas.openxmlformats.org/drawingml/2006/main" xmlns="" val="0"/>
+                <a14:useLocalDpi xmlns="" xmlns:a="http://schemas.openxmlformats.org/drawingml/2006/main" xmlns:r="http://schemas.openxmlformats.org/officeDocument/2006/relationships" xmlns:p="http://schemas.openxmlformats.org/presentationml/2006/main" xmlns:a14="http://schemas.microsoft.com/office/drawing/2010/main" xmlns:mv="urn:schemas-microsoft-com:mac:vml" xmlns:mc="http://schemas.openxmlformats.org/markup-compatibility/2006" val="0"/>
               </a:ext>
             </a:extLst>
           </a:blip>
@@ -3294,7 +3294,7 @@
           <a:noFill/>
           <a:extLst>
             <a:ext uri="{909E8E84-426E-40DD-AFC4-6F175D3DCCD1}">
-              <a14:hiddenFill xmlns:a14="http://schemas.microsoft.com/office/drawing/2010/main" xmlns:p="http://schemas.openxmlformats.org/presentationml/2006/main" xmlns:r="http://schemas.openxmlformats.org/officeDocument/2006/relationships" xmlns:a="http://schemas.openxmlformats.org/drawingml/2006/main" xmlns="">
+              <a14:hiddenFill xmlns="" xmlns:a="http://schemas.openxmlformats.org/drawingml/2006/main" xmlns:r="http://schemas.openxmlformats.org/officeDocument/2006/relationships" xmlns:p="http://schemas.openxmlformats.org/presentationml/2006/main" xmlns:a14="http://schemas.microsoft.com/office/drawing/2010/main" xmlns:mv="urn:schemas-microsoft-com:mac:vml" xmlns:mc="http://schemas.openxmlformats.org/markup-compatibility/2006">
                 <a:solidFill>
                   <a:srgbClr val="FFFFFF"/>
                 </a:solidFill>
@@ -3315,7 +3315,7 @@
           <a:blip r:embed="rId4">
             <a:extLst>
               <a:ext uri="{28A0092B-C50C-407E-A947-70E740481C1C}">
-                <a14:useLocalDpi xmlns:a14="http://schemas.microsoft.com/office/drawing/2010/main" xmlns:p="http://schemas.openxmlformats.org/presentationml/2006/main" xmlns:r="http://schemas.openxmlformats.org/officeDocument/2006/relationships" xmlns:a="http://schemas.openxmlformats.org/drawingml/2006/main" xmlns="" val="0"/>
+                <a14:useLocalDpi xmlns="" xmlns:a="http://schemas.openxmlformats.org/drawingml/2006/main" xmlns:r="http://schemas.openxmlformats.org/officeDocument/2006/relationships" xmlns:p="http://schemas.openxmlformats.org/presentationml/2006/main" xmlns:a14="http://schemas.microsoft.com/office/drawing/2010/main" xmlns:mv="urn:schemas-microsoft-com:mac:vml" xmlns:mc="http://schemas.openxmlformats.org/markup-compatibility/2006" val="0"/>
               </a:ext>
             </a:extLst>
           </a:blip>
@@ -3335,7 +3335,7 @@
           <a:noFill/>
           <a:extLst>
             <a:ext uri="{909E8E84-426E-40DD-AFC4-6F175D3DCCD1}">
-              <a14:hiddenFill xmlns:a14="http://schemas.microsoft.com/office/drawing/2010/main" xmlns:p="http://schemas.openxmlformats.org/presentationml/2006/main" xmlns:r="http://schemas.openxmlformats.org/officeDocument/2006/relationships" xmlns:a="http://schemas.openxmlformats.org/drawingml/2006/main" xmlns="">
+              <a14:hiddenFill xmlns="" xmlns:a="http://schemas.openxmlformats.org/drawingml/2006/main" xmlns:r="http://schemas.openxmlformats.org/officeDocument/2006/relationships" xmlns:p="http://schemas.openxmlformats.org/presentationml/2006/main" xmlns:a14="http://schemas.microsoft.com/office/drawing/2010/main" xmlns:mv="urn:schemas-microsoft-com:mac:vml" xmlns:mc="http://schemas.openxmlformats.org/markup-compatibility/2006">
                 <a:solidFill>
                   <a:srgbClr val="FFFFFF"/>
                 </a:solidFill>
@@ -3561,15 +3561,7 @@
           <a:p>
             <a:r>
               <a:rPr lang="en-US" dirty="0" smtClean="0"/>
-              <a:t>Particle in Cell Code with Adaptive</a:t>
-            </a:r>
-            <a:r>
-              <a:rPr lang="en-US" dirty="0" smtClean="0"/>
-              <a:t> 3D Grid </a:t>
-            </a:r>
-            <a:r>
-              <a:rPr lang="en-US" dirty="0" smtClean="0"/>
-              <a:t>and Dynamic Load Balancing</a:t>
+              <a:t>Particle in Cell Code with Adaptive 3D Grid and Dynamic Load Balancing</a:t>
             </a:r>
           </a:p>
         </p:txBody>
@@ -3615,7 +3607,7 @@
     </p:spTree>
     <p:extLst>
       <p:ext uri="{BB962C8B-B14F-4D97-AF65-F5344CB8AC3E}">
-        <p14:creationId xmlns:p14="http://schemas.microsoft.com/office/powerpoint/2010/main" xmlns:p="http://schemas.openxmlformats.org/presentationml/2006/main" xmlns:r="http://schemas.openxmlformats.org/officeDocument/2006/relationships" xmlns:a="http://schemas.openxmlformats.org/drawingml/2006/main" xmlns="" val="1062993296"/>
+        <p14:creationId xmlns="" xmlns:a="http://schemas.openxmlformats.org/drawingml/2006/main" xmlns:r="http://schemas.openxmlformats.org/officeDocument/2006/relationships" xmlns:p="http://schemas.openxmlformats.org/presentationml/2006/main" xmlns:p14="http://schemas.microsoft.com/office/powerpoint/2010/main" xmlns:mv="urn:schemas-microsoft-com:mac:vml" xmlns:mc="http://schemas.openxmlformats.org/markup-compatibility/2006" val="1062993296"/>
       </p:ext>
     </p:extLst>
   </p:cSld>
@@ -4175,7 +4167,7 @@
         </p:spPr>
         <p:txBody>
           <a:bodyPr>
-            <a:normAutofit fontScale="70000" lnSpcReduction="20000"/>
+            <a:normAutofit fontScale="92500" lnSpcReduction="20000"/>
           </a:bodyPr>
           <a:lstStyle/>
           <a:p>
@@ -4183,20 +4175,36 @@
               <a:rPr lang="en-US" dirty="0" smtClean="0"/>
               <a:t>Start with a 3-dimensional grid</a:t>
             </a:r>
+            <a:endParaRPr lang="en-US" dirty="0" smtClean="0"/>
           </a:p>
           <a:p>
             <a:pPr lvl="1"/>
             <a:r>
               <a:rPr lang="en-US" dirty="0" smtClean="0"/>
-              <a:t>If </a:t>
-            </a:r>
-            <a:r>
-              <a:rPr lang="en-US" u="sng" dirty="0" smtClean="0"/>
-              <a:t>D is the finest resolution per dimension</a:t>
+              <a:t>If D=Finest </a:t>
             </a:r>
             <a:r>
               <a:rPr lang="en-US" dirty="0" smtClean="0"/>
-              <a:t>, a static grid would have D</a:t>
+              <a:t>grid dimension needed…</a:t>
+            </a:r>
+          </a:p>
+          <a:p>
+            <a:pPr lvl="2"/>
+            <a:r>
+              <a:rPr lang="en-US" dirty="0" smtClean="0"/>
+              <a:t>S</a:t>
+            </a:r>
+            <a:r>
+              <a:rPr lang="en-US" dirty="0" smtClean="0"/>
+              <a:t>tatic grid</a:t>
+            </a:r>
+            <a:r>
+              <a:rPr lang="en-US" dirty="0" smtClean="0"/>
+              <a:t>: </a:t>
+            </a:r>
+            <a:r>
+              <a:rPr lang="en-US" dirty="0" smtClean="0"/>
+              <a:t>D</a:t>
             </a:r>
             <a:r>
               <a:rPr lang="en-US" baseline="30000" dirty="0" smtClean="0"/>
@@ -4204,28 +4212,26 @@
             </a:r>
             <a:r>
               <a:rPr lang="en-US" dirty="0" smtClean="0"/>
-              <a:t> grid points</a:t>
-            </a:r>
-          </a:p>
-          <a:p>
-            <a:pPr lvl="1"/>
+              <a:t> </a:t>
+            </a:r>
             <a:r>
               <a:rPr lang="en-US" dirty="0" smtClean="0"/>
-              <a:t>In real world, D ≈ 1,000,000 ; This is unmanageable</a:t>
-            </a:r>
-          </a:p>
-          <a:p>
-            <a:pPr lvl="1"/>
+              <a:t>grid </a:t>
+            </a:r>
             <a:r>
               <a:rPr lang="en-US" dirty="0" smtClean="0"/>
-              <a:t>A dynamic grid only requires D resolution in small portion of the grid</a:t>
-            </a:r>
-          </a:p>
-          <a:p>
-            <a:pPr lvl="1"/>
+              <a:t>points</a:t>
+            </a:r>
+          </a:p>
+          <a:p>
+            <a:pPr lvl="2"/>
             <a:r>
               <a:rPr lang="en-US" dirty="0" smtClean="0"/>
-              <a:t>For us: D ≈ 100 (D</a:t>
+              <a:t>D</a:t>
+            </a:r>
+            <a:r>
+              <a:rPr lang="en-US" dirty="0" smtClean="0"/>
+              <a:t>ynamic: D</a:t>
             </a:r>
             <a:r>
               <a:rPr lang="en-US" baseline="30000" dirty="0" smtClean="0"/>
@@ -4233,14 +4239,26 @@
             </a:r>
             <a:r>
               <a:rPr lang="en-US" dirty="0" smtClean="0"/>
-              <a:t> ≈ 1,000,000), but only in ≈1/1,000 of the grid</a:t>
+              <a:t> </a:t>
+            </a:r>
+            <a:r>
+              <a:rPr lang="en-US" dirty="0" err="1" smtClean="0"/>
+              <a:t>x</a:t>
+            </a:r>
+            <a:r>
+              <a:rPr lang="en-US" dirty="0" smtClean="0"/>
+              <a:t> (small factor) grid points</a:t>
             </a:r>
           </a:p>
           <a:p>
             <a:pPr lvl="1"/>
             <a:r>
               <a:rPr lang="en-US" dirty="0" smtClean="0"/>
-              <a:t>However: dynamic grid makes load balancing very tricky</a:t>
+              <a:t>However</a:t>
+            </a:r>
+            <a:r>
+              <a:rPr lang="en-US" dirty="0" smtClean="0"/>
+              <a:t>: dynamic grid makes load balancing very tricky</a:t>
             </a:r>
           </a:p>
           <a:p>
@@ -4248,34 +4266,42 @@
               <a:rPr lang="en-US" dirty="0" smtClean="0"/>
               <a:t>Problem: Load balancing</a:t>
             </a:r>
+            <a:endParaRPr lang="en-US" dirty="0" smtClean="0"/>
           </a:p>
           <a:p>
             <a:pPr lvl="1"/>
             <a:r>
               <a:rPr lang="en-US" dirty="0" smtClean="0"/>
-              <a:t>How to balance: Grid points? Particles? Both?</a:t>
+              <a:t>Distributed memory</a:t>
             </a:r>
           </a:p>
           <a:p>
             <a:pPr lvl="1"/>
             <a:r>
               <a:rPr lang="en-US" dirty="0" smtClean="0"/>
-              <a:t>Answer: Get weighted calculation of current grid + particle load, Broadcast All2All load sizes, each grid point decides to either Give some load or Take some load</a:t>
-            </a:r>
+              <a:t>Balancing both grid points (dynamic) and particles (moving)</a:t>
+            </a:r>
+            <a:endParaRPr lang="en-US" dirty="0" smtClean="0"/>
           </a:p>
           <a:p>
             <a:pPr lvl="1"/>
             <a:r>
               <a:rPr lang="en-US" dirty="0" smtClean="0"/>
-              <a:t>How to most efficiently communicate load exchanges between processors at each time step?</a:t>
-            </a:r>
-          </a:p>
-          <a:p>
-            <a:pPr lvl="1"/>
+              <a:t>Need small All2All </a:t>
+            </a:r>
+            <a:r>
+              <a:rPr lang="en-US" dirty="0" err="1" smtClean="0"/>
+              <a:t>comm</a:t>
+            </a:r>
             <a:r>
               <a:rPr lang="en-US" dirty="0" smtClean="0"/>
-              <a:t>Answer: Give or Take only with neighbors (doing this well is the tricky part)</a:t>
-            </a:r>
+              <a:t>, lots of (intelligent) neighbor </a:t>
+            </a:r>
+            <a:r>
+              <a:rPr lang="en-US" dirty="0" err="1" smtClean="0"/>
+              <a:t>comm</a:t>
+            </a:r>
+            <a:endParaRPr lang="en-US" dirty="0" smtClean="0"/>
           </a:p>
         </p:txBody>
       </p:sp>
@@ -4353,11 +4379,7 @@
           <a:p>
             <a:r>
               <a:rPr lang="en-US" dirty="0" smtClean="0"/>
-              <a:t>N</a:t>
-            </a:r>
-            <a:r>
-              <a:rPr lang="en-US" dirty="0" smtClean="0"/>
-              <a:t> = number of grid points</a:t>
+              <a:t>N = number of grid points</a:t>
             </a:r>
           </a:p>
           <a:p>
@@ -4376,15 +4398,7 @@
             <a:pPr lvl="1"/>
             <a:r>
               <a:rPr lang="en-US" dirty="0" smtClean="0"/>
-              <a:t>Complexity = O(N+</a:t>
-            </a:r>
-            <a:r>
-              <a:rPr lang="en-US" dirty="0" smtClean="0"/>
-              <a:t>M</a:t>
-            </a:r>
-            <a:r>
-              <a:rPr lang="en-US" dirty="0" smtClean="0"/>
-              <a:t>)</a:t>
+              <a:t>Complexity = O(N+M)</a:t>
             </a:r>
           </a:p>
           <a:p>
@@ -4397,15 +4411,7 @@
             <a:pPr lvl="1"/>
             <a:r>
               <a:rPr lang="en-US" dirty="0" smtClean="0"/>
-              <a:t>Complexity = O((N+</a:t>
-            </a:r>
-            <a:r>
-              <a:rPr lang="en-US" dirty="0" smtClean="0"/>
-              <a:t>M</a:t>
-            </a:r>
-            <a:r>
-              <a:rPr lang="en-US" dirty="0" smtClean="0"/>
-              <a:t>)/</a:t>
+              <a:t>Complexity = O((N+M)/</a:t>
             </a:r>
             <a:r>
               <a:rPr lang="en-US" dirty="0" err="1" smtClean="0"/>
@@ -4531,25 +4537,43 @@
           </a:p>
         </p:txBody>
       </p:sp>
-      <p:sp>
-        <p:nvSpPr>
-          <p:cNvPr id="3" name="Content Placeholder 2"/>
-          <p:cNvSpPr>
-            <a:spLocks noGrp="1"/>
-          </p:cNvSpPr>
+      <p:pic>
+        <p:nvPicPr>
+          <p:cNvPr id="6" name="Content Placeholder 5" descr="Load_Balancer_Pseudocode.pdf"/>
+          <p:cNvPicPr>
+            <a:picLocks noGrp="1" noChangeAspect="1"/>
+          </p:cNvPicPr>
           <p:nvPr>
             <p:ph idx="1"/>
           </p:nvPr>
-        </p:nvSpPr>
-        <p:spPr/>
-        <p:txBody>
-          <a:bodyPr/>
-          <a:lstStyle/>
-          <a:p>
-            <a:endParaRPr lang="en-US" dirty="0"/>
-          </a:p>
-        </p:txBody>
-      </p:sp>
+        </p:nvPicPr>
+        <mc:AlternateContent>
+          <mc:Choice xmlns:ma="http://schemas.microsoft.com/office/mac/drawingml/2008/main" Requires="ma">
+            <p:blipFill>
+              <a:blip r:embed="rId2"/>
+              <a:srcRect l="-20253" r="-20253"/>
+              <a:stretch>
+                <a:fillRect/>
+              </a:stretch>
+            </p:blipFill>
+          </mc:Choice>
+          <mc:Fallback>
+            <p:blipFill>
+              <a:blip r:embed="rId3"/>
+              <a:srcRect l="-20253" r="-20253"/>
+              <a:stretch>
+                <a:fillRect/>
+              </a:stretch>
+            </p:blipFill>
+          </mc:Fallback>
+        </mc:AlternateContent>
+        <p:spPr>
+          <a:xfrm>
+            <a:off x="-685906" y="1143000"/>
+            <a:ext cx="10391636" cy="5715000"/>
+          </a:xfrm>
+        </p:spPr>
+      </p:pic>
     </p:spTree>
   </p:cSld>
   <p:clrMapOvr>

</xml_diff>